<commit_message>
new sldies for 4430
</commit_message>
<xml_diff>
--- a/assets/courses/compilers/spring2017/slides/Introduction.pptx
+++ b/assets/courses/compilers/spring2017/slides/Introduction.pptx
@@ -244,7 +244,7 @@
             <a:fld id="{248F8A12-F8FB-314A-82C1-6D9643D5BB35}" type="datetimeFigureOut">
               <a:rPr lang="en-US" smtClean="0"/>
               <a:pPr/>
-              <a:t>1/17/17</a:t>
+              <a:t>1/18/17</a:t>
             </a:fld>
             <a:endParaRPr lang="en-US"/>
           </a:p>
@@ -4117,13 +4117,8 @@
             <a:pPr eaLnBrk="1" hangingPunct="1"/>
             <a:r>
               <a:rPr lang="en-US" dirty="0" smtClean="0"/>
-              <a:t>Spring </a:t>
-            </a:r>
-            <a:r>
-              <a:rPr lang="en-US" dirty="0" smtClean="0"/>
-              <a:t>2017</a:t>
-            </a:r>
-            <a:endParaRPr lang="en-US" dirty="0" smtClean="0"/>
+              <a:t>Spring 2017</a:t>
+            </a:r>
           </a:p>
           <a:p>
             <a:pPr eaLnBrk="1" hangingPunct="1"/>
@@ -4142,6 +4137,13 @@
   <p:clrMapOvr>
     <a:masterClrMapping/>
   </p:clrMapOvr>
+  <p:timing>
+    <p:tnLst>
+      <p:par>
+        <p:cTn xmlns:p14="http://schemas.microsoft.com/office/powerpoint/2010/main" id="1" dur="indefinite" restart="never" nodeType="tmRoot"/>
+      </p:par>
+    </p:tnLst>
+  </p:timing>
 </p:sld>
 </file>
 
@@ -4843,6 +4845,13 @@
   <p:clrMapOvr>
     <a:masterClrMapping/>
   </p:clrMapOvr>
+  <p:timing>
+    <p:tnLst>
+      <p:par>
+        <p:cTn xmlns:p14="http://schemas.microsoft.com/office/powerpoint/2010/main" id="1" dur="indefinite" restart="never" nodeType="tmRoot"/>
+      </p:par>
+    </p:tnLst>
+  </p:timing>
 </p:sld>
 </file>
 
@@ -6284,6 +6293,13 @@
   <p:clrMapOvr>
     <a:masterClrMapping/>
   </p:clrMapOvr>
+  <p:timing>
+    <p:tnLst>
+      <p:par>
+        <p:cTn xmlns:p14="http://schemas.microsoft.com/office/powerpoint/2010/main" id="1" dur="indefinite" restart="never" nodeType="tmRoot"/>
+      </p:par>
+    </p:tnLst>
+  </p:timing>
 </p:sld>
 </file>
 
@@ -6784,6 +6800,13 @@
   <p:clrMapOvr>
     <a:masterClrMapping/>
   </p:clrMapOvr>
+  <p:timing>
+    <p:tnLst>
+      <p:par>
+        <p:cTn xmlns:p14="http://schemas.microsoft.com/office/powerpoint/2010/main" id="1" dur="indefinite" restart="never" nodeType="tmRoot"/>
+      </p:par>
+    </p:tnLst>
+  </p:timing>
 </p:sld>
 </file>
 
@@ -7895,6 +7918,13 @@
   <p:clrMapOvr>
     <a:masterClrMapping/>
   </p:clrMapOvr>
+  <p:timing>
+    <p:tnLst>
+      <p:par>
+        <p:cTn xmlns:p14="http://schemas.microsoft.com/office/powerpoint/2010/main" id="1" dur="indefinite" restart="never" nodeType="tmRoot"/>
+      </p:par>
+    </p:tnLst>
+  </p:timing>
 </p:sld>
 </file>
 
@@ -8267,11 +8297,7 @@
             </a:pPr>
             <a:r>
               <a:rPr lang="en-US" sz="2400" dirty="0" smtClean="0"/>
-              <a:t>Textbook: </a:t>
-            </a:r>
-            <a:r>
-              <a:rPr lang="en-US" sz="2400" dirty="0" smtClean="0"/>
-              <a:t>“</a:t>
+              <a:t>Textbook: “</a:t>
             </a:r>
             <a:r>
               <a:rPr lang="en-US" sz="2400" dirty="0" smtClean="0">
@@ -8290,19 +8316,7 @@
             </a:pPr>
             <a:r>
               <a:rPr lang="en-US" sz="2400" dirty="0" smtClean="0"/>
-              <a:t> </a:t>
-            </a:r>
-            <a:r>
-              <a:rPr lang="en-US" sz="2400" dirty="0" smtClean="0"/>
-              <a:t>Book </a:t>
-            </a:r>
-            <a:r>
-              <a:rPr lang="en-US" sz="2400" dirty="0" smtClean="0"/>
-              <a:t>is available at amazon (and in kindle format</a:t>
-            </a:r>
-            <a:r>
-              <a:rPr lang="en-US" sz="2400" dirty="0" smtClean="0"/>
-              <a:t>) and at the bookstore</a:t>
+              <a:t> Book is available at amazon (and in kindle format) and at the bookstore</a:t>
             </a:r>
             <a:endParaRPr lang="en-US" sz="2400" dirty="0"/>
           </a:p>
@@ -8322,15 +8336,7 @@
             </a:r>
             <a:r>
               <a:rPr lang="en-US" sz="2400" dirty="0" smtClean="0"/>
-              <a:t>be </a:t>
-            </a:r>
-            <a:r>
-              <a:rPr lang="en-US" sz="2400" dirty="0" smtClean="0"/>
-              <a:t>written in </a:t>
-            </a:r>
-            <a:r>
-              <a:rPr lang="en-US" sz="2400" dirty="0" smtClean="0"/>
-              <a:t>Haskell</a:t>
+              <a:t>be written in Haskell</a:t>
             </a:r>
           </a:p>
           <a:p>
@@ -8343,7 +8349,6 @@
               <a:rPr lang="en-US" sz="2200" dirty="0" smtClean="0"/>
               <a:t>4450 is a prerequisite for this class, so you should have learned Haskell there</a:t>
             </a:r>
-            <a:endParaRPr lang="en-US" sz="2200" dirty="0" smtClean="0"/>
           </a:p>
           <a:p>
             <a:pPr eaLnBrk="1" hangingPunct="1">
@@ -8357,15 +8362,7 @@
             </a:r>
             <a:r>
               <a:rPr lang="en-US" sz="2400" dirty="0" smtClean="0"/>
-              <a:t>: </a:t>
-            </a:r>
-            <a:r>
-              <a:rPr lang="en-US" sz="2400" dirty="0" smtClean="0"/>
-              <a:t>get the </a:t>
-            </a:r>
-            <a:r>
-              <a:rPr lang="en-US" sz="2400" dirty="0" smtClean="0"/>
-              <a:t>text!</a:t>
+              <a:t>: get the text!</a:t>
             </a:r>
           </a:p>
           <a:p>
@@ -8468,23 +8465,7 @@
             </a:pPr>
             <a:r>
               <a:rPr lang="en-US" sz="2400" dirty="0" smtClean="0"/>
-              <a:t>Final </a:t>
-            </a:r>
-            <a:r>
-              <a:rPr lang="en-US" sz="2400" dirty="0" smtClean="0"/>
-              <a:t>(</a:t>
-            </a:r>
-            <a:r>
-              <a:rPr lang="en-US" sz="2400" dirty="0" smtClean="0"/>
-              <a:t>30</a:t>
-            </a:r>
-            <a:r>
-              <a:rPr lang="en-US" sz="2400" dirty="0" smtClean="0"/>
-              <a:t>%</a:t>
-            </a:r>
-            <a:r>
-              <a:rPr lang="en-US" sz="2400" dirty="0" smtClean="0"/>
-              <a:t>)</a:t>
+              <a:t>Final (30%)</a:t>
             </a:r>
           </a:p>
           <a:p>
@@ -8505,7 +8486,6 @@
               <a:rPr lang="en-US" sz="2400" dirty="0" smtClean="0"/>
               <a:t>5% + 15%)</a:t>
             </a:r>
-            <a:endParaRPr lang="en-US" sz="2400" dirty="0" smtClean="0"/>
           </a:p>
           <a:p>
             <a:pPr lvl="1" eaLnBrk="1" hangingPunct="1">
@@ -8515,21 +8495,8 @@
             </a:pPr>
             <a:r>
               <a:rPr lang="en-US" sz="2400" dirty="0" smtClean="0"/>
-              <a:t>Homework/programming assignments/project </a:t>
-            </a:r>
-            <a:r>
-              <a:rPr lang="en-US" sz="2400" dirty="0" smtClean="0"/>
-              <a:t>(40</a:t>
-            </a:r>
-            <a:r>
-              <a:rPr lang="en-US" sz="2400" dirty="0" smtClean="0"/>
-              <a:t>%</a:t>
-            </a:r>
-            <a:r>
-              <a:rPr lang="en-US" sz="2400" dirty="0" smtClean="0"/>
-              <a:t>)</a:t>
-            </a:r>
-            <a:endParaRPr lang="en-US" sz="2400" dirty="0" smtClean="0"/>
+              <a:t>Homework/programming assignments/project (40%)</a:t>
+            </a:r>
           </a:p>
           <a:p>
             <a:pPr eaLnBrk="1" hangingPunct="1">
@@ -9486,16 +9453,22 @@
           <a:p>
             <a:pPr lvl="2" eaLnBrk="1" hangingPunct="1"/>
             <a:r>
-              <a:rPr lang="en-US" dirty="0" smtClean="0"/>
-              <a:t>TBA</a:t>
-            </a:r>
+              <a:rPr lang="en-US" dirty="0">
+                <a:hlinkClick r:id="rId2"/>
+              </a:rPr>
+              <a:t>https://harrisonwl.github.io/doc/cs4430.</a:t>
+            </a:r>
+            <a:r>
+              <a:rPr lang="en-US" dirty="0" smtClean="0">
+                <a:hlinkClick r:id="rId2"/>
+              </a:rPr>
+              <a:t>html</a:t>
+            </a:r>
+            <a:endParaRPr lang="en-US" dirty="0" smtClean="0"/>
           </a:p>
           <a:p>
             <a:pPr lvl="2" eaLnBrk="1" hangingPunct="1"/>
-            <a:r>
-              <a:rPr lang="en-US" dirty="0" smtClean="0"/>
-              <a:t>“under construction” at the moment</a:t>
-            </a:r>
+            <a:endParaRPr lang="en-US" dirty="0" smtClean="0"/>
           </a:p>
         </p:txBody>
       </p:sp>
@@ -11965,6 +11938,13 @@
   <p:clrMapOvr>
     <a:masterClrMapping/>
   </p:clrMapOvr>
+  <p:timing>
+    <p:tnLst>
+      <p:par>
+        <p:cTn xmlns:p14="http://schemas.microsoft.com/office/powerpoint/2010/main" id="1" dur="indefinite" restart="never" nodeType="tmRoot"/>
+      </p:par>
+    </p:tnLst>
+  </p:timing>
 </p:sld>
 </file>
 
@@ -12168,6 +12148,13 @@
   <p:clrMapOvr>
     <a:masterClrMapping/>
   </p:clrMapOvr>
+  <p:timing>
+    <p:tnLst>
+      <p:par>
+        <p:cTn xmlns:p14="http://schemas.microsoft.com/office/powerpoint/2010/main" id="1" dur="indefinite" restart="never" nodeType="tmRoot"/>
+      </p:par>
+    </p:tnLst>
+  </p:timing>
 </p:sld>
 </file>
 
@@ -13169,6 +13156,13 @@
   <p:clrMapOvr>
     <a:masterClrMapping/>
   </p:clrMapOvr>
+  <p:timing>
+    <p:tnLst>
+      <p:par>
+        <p:cTn xmlns:p14="http://schemas.microsoft.com/office/powerpoint/2010/main" id="1" dur="indefinite" restart="never" nodeType="tmRoot"/>
+      </p:par>
+    </p:tnLst>
+  </p:timing>
 </p:sld>
 </file>
 
@@ -13435,6 +13429,13 @@
   <p:clrMapOvr>
     <a:masterClrMapping/>
   </p:clrMapOvr>
+  <p:timing>
+    <p:tnLst>
+      <p:par>
+        <p:cTn xmlns:p14="http://schemas.microsoft.com/office/powerpoint/2010/main" id="1" dur="indefinite" restart="never" nodeType="tmRoot"/>
+      </p:par>
+    </p:tnLst>
+  </p:timing>
 </p:sld>
 </file>
 
@@ -14508,6 +14509,13 @@
   <p:clrMapOvr>
     <a:masterClrMapping/>
   </p:clrMapOvr>
+  <p:timing>
+    <p:tnLst>
+      <p:par>
+        <p:cTn xmlns:p14="http://schemas.microsoft.com/office/powerpoint/2010/main" id="1" dur="indefinite" restart="never" nodeType="tmRoot"/>
+      </p:par>
+    </p:tnLst>
+  </p:timing>
 </p:sld>
 </file>
 
@@ -15798,6 +15806,13 @@
   <p:clrMapOvr>
     <a:masterClrMapping/>
   </p:clrMapOvr>
+  <p:timing>
+    <p:tnLst>
+      <p:par>
+        <p:cTn xmlns:p14="http://schemas.microsoft.com/office/powerpoint/2010/main" id="1" dur="indefinite" restart="never" nodeType="tmRoot"/>
+      </p:par>
+    </p:tnLst>
+  </p:timing>
 </p:sld>
 </file>
 
@@ -17174,6 +17189,13 @@
   <p:clrMapOvr>
     <a:masterClrMapping/>
   </p:clrMapOvr>
+  <p:timing>
+    <p:tnLst>
+      <p:par>
+        <p:cTn xmlns:p14="http://schemas.microsoft.com/office/powerpoint/2010/main" id="1" dur="indefinite" restart="never" nodeType="tmRoot"/>
+      </p:par>
+    </p:tnLst>
+  </p:timing>
 </p:sld>
 </file>
 

</xml_diff>